<commit_message>
Modified Infographics scale and point system
</commit_message>
<xml_diff>
--- a/_static/EcoTask/figures/Infographic_graphs/sketch diagram.pptx
+++ b/_static/EcoTask/figures/Infographic_graphs/sketch diagram.pptx
@@ -6,11 +6,11 @@
   </p:sldMasterIdLst>
   <p:sldIdLst>
     <p:sldId id="262" r:id="rId2"/>
-    <p:sldId id="266" r:id="rId3"/>
-    <p:sldId id="267" r:id="rId4"/>
+    <p:sldId id="264" r:id="rId3"/>
+    <p:sldId id="265" r:id="rId4"/>
     <p:sldId id="263" r:id="rId5"/>
-    <p:sldId id="264" r:id="rId6"/>
-    <p:sldId id="265" r:id="rId7"/>
+    <p:sldId id="266" r:id="rId6"/>
+    <p:sldId id="267" r:id="rId7"/>
   </p:sldIdLst>
   <p:sldSz cx="12192000" cy="6858000"/>
   <p:notesSz cx="6858000" cy="9144000"/>
@@ -295,8 +295,8 @@
         <c:axId val="510073344"/>
         <c:scaling>
           <c:orientation val="minMax"/>
-          <c:max val="7"/>
-          <c:min val="4"/>
+          <c:max val="60"/>
+          <c:min val="30"/>
         </c:scaling>
         <c:delete val="0"/>
         <c:axPos val="l"/>
@@ -338,7 +338,7 @@
                     <a:latin typeface="Arial" panose="020B0604020202020204" pitchFamily="34" charset="0"/>
                     <a:cs typeface="Arial" panose="020B0604020202020204" pitchFamily="34" charset="0"/>
                   </a:rPr>
-                  <a:t>Pounds</a:t>
+                  <a:t>Points</a:t>
                 </a:r>
               </a:p>
             </c:rich>
@@ -348,7 +348,7 @@
               <c:xMode val="edge"/>
               <c:yMode val="edge"/>
               <c:x val="7.8125E-3"/>
-              <c:y val="0.46611722034219855"/>
+              <c:y val="0.43564847221650638"/>
             </c:manualLayout>
           </c:layout>
           <c:overlay val="0"/>
@@ -416,7 +416,7 @@
         <c:crossAx val="816337520"/>
         <c:crosses val="autoZero"/>
         <c:crossBetween val="between"/>
-        <c:majorUnit val="0.5"/>
+        <c:majorUnit val="5"/>
       </c:valAx>
       <c:spPr>
         <a:pattFill prst="pct20">
@@ -646,8 +646,8 @@
         <c:axId val="510073344"/>
         <c:scaling>
           <c:orientation val="minMax"/>
-          <c:max val="7"/>
-          <c:min val="4"/>
+          <c:max val="60"/>
+          <c:min val="30"/>
         </c:scaling>
         <c:delete val="0"/>
         <c:axPos val="l"/>
@@ -689,7 +689,7 @@
                     <a:latin typeface="Arial" panose="020B0604020202020204" pitchFamily="34" charset="0"/>
                     <a:cs typeface="Arial" panose="020B0604020202020204" pitchFamily="34" charset="0"/>
                   </a:rPr>
-                  <a:t>Pounds</a:t>
+                  <a:t>Points</a:t>
                 </a:r>
               </a:p>
             </c:rich>
@@ -698,8 +698,8 @@
             <c:manualLayout>
               <c:xMode val="edge"/>
               <c:yMode val="edge"/>
-              <c:x val="7.8125E-3"/>
-              <c:y val="0.46611722034219855"/>
+              <c:x val="9.3749999999999997E-3"/>
+              <c:y val="0.43564847221650638"/>
             </c:manualLayout>
           </c:layout>
           <c:overlay val="0"/>
@@ -767,7 +767,7 @@
         <c:crossAx val="816337520"/>
         <c:crosses val="autoZero"/>
         <c:crossBetween val="between"/>
-        <c:majorUnit val="0.5"/>
+        <c:majorUnit val="5"/>
       </c:valAx>
       <c:spPr>
         <a:pattFill prst="pct20">
@@ -997,8 +997,8 @@
         <c:axId val="510073344"/>
         <c:scaling>
           <c:orientation val="minMax"/>
-          <c:max val="7"/>
-          <c:min val="4"/>
+          <c:max val="60"/>
+          <c:min val="30"/>
         </c:scaling>
         <c:delete val="0"/>
         <c:axPos val="l"/>
@@ -1040,7 +1040,7 @@
                     <a:latin typeface="Arial" panose="020B0604020202020204" pitchFamily="34" charset="0"/>
                     <a:cs typeface="Arial" panose="020B0604020202020204" pitchFamily="34" charset="0"/>
                   </a:rPr>
-                  <a:t>Pounds</a:t>
+                  <a:t>Points</a:t>
                 </a:r>
               </a:p>
             </c:rich>
@@ -1049,8 +1049,8 @@
             <c:manualLayout>
               <c:xMode val="edge"/>
               <c:yMode val="edge"/>
-              <c:x val="7.8125E-3"/>
-              <c:y val="0.46611722034219855"/>
+              <c:x val="9.3749999999999997E-3"/>
+              <c:y val="0.4426797217839738"/>
             </c:manualLayout>
           </c:layout>
           <c:overlay val="0"/>
@@ -1118,7 +1118,7 @@
         <c:crossAx val="816337520"/>
         <c:crosses val="autoZero"/>
         <c:crossBetween val="between"/>
-        <c:majorUnit val="0.5"/>
+        <c:majorUnit val="5"/>
       </c:valAx>
       <c:spPr>
         <a:pattFill prst="pct20">
@@ -1348,7 +1348,7 @@
         <c:axId val="510073344"/>
         <c:scaling>
           <c:orientation val="minMax"/>
-          <c:max val="6"/>
+          <c:max val="30"/>
           <c:min val="0"/>
         </c:scaling>
         <c:delete val="0"/>
@@ -1391,21 +1391,7 @@
                     <a:latin typeface="Arial" panose="020B0604020202020204" pitchFamily="34" charset="0"/>
                     <a:cs typeface="Arial" panose="020B0604020202020204" pitchFamily="34" charset="0"/>
                   </a:rPr>
-                  <a:t>Amount of planted</a:t>
-                </a:r>
-                <a:r>
-                  <a:rPr lang="en-US" sz="1600" b="0" baseline="0" dirty="0">
-                    <a:latin typeface="Arial" panose="020B0604020202020204" pitchFamily="34" charset="0"/>
-                    <a:cs typeface="Arial" panose="020B0604020202020204" pitchFamily="34" charset="0"/>
-                  </a:rPr>
-                  <a:t> </a:t>
-                </a:r>
-                <a:r>
-                  <a:rPr lang="en-US" sz="1600" b="0" dirty="0">
-                    <a:latin typeface="Arial" panose="020B0604020202020204" pitchFamily="34" charset="0"/>
-                    <a:cs typeface="Arial" panose="020B0604020202020204" pitchFamily="34" charset="0"/>
-                  </a:rPr>
-                  <a:t>trees</a:t>
+                  <a:t>Points</a:t>
                 </a:r>
               </a:p>
             </c:rich>
@@ -1414,8 +1400,8 @@
             <c:manualLayout>
               <c:xMode val="edge"/>
               <c:yMode val="edge"/>
-              <c:x val="1.7187500000000001E-2"/>
-              <c:y val="0.33017972870449502"/>
+              <c:x val="1.0937499999999999E-2"/>
+              <c:y val="0.43564847221650638"/>
             </c:manualLayout>
           </c:layout>
           <c:overlay val="0"/>
@@ -1483,7 +1469,7 @@
         <c:crossAx val="816337520"/>
         <c:crosses val="autoZero"/>
         <c:crossBetween val="between"/>
-        <c:majorUnit val="1"/>
+        <c:majorUnit val="5"/>
       </c:valAx>
       <c:spPr>
         <a:pattFill prst="pct20">
@@ -1713,7 +1699,7 @@
         <c:axId val="510073344"/>
         <c:scaling>
           <c:orientation val="minMax"/>
-          <c:max val="6"/>
+          <c:max val="30"/>
           <c:min val="0"/>
         </c:scaling>
         <c:delete val="0"/>
@@ -1756,21 +1742,7 @@
                     <a:latin typeface="Arial" panose="020B0604020202020204" pitchFamily="34" charset="0"/>
                     <a:cs typeface="Arial" panose="020B0604020202020204" pitchFamily="34" charset="0"/>
                   </a:rPr>
-                  <a:t>Amount of planted</a:t>
-                </a:r>
-                <a:r>
-                  <a:rPr lang="en-US" sz="1600" b="0" baseline="0" dirty="0">
-                    <a:latin typeface="Arial" panose="020B0604020202020204" pitchFamily="34" charset="0"/>
-                    <a:cs typeface="Arial" panose="020B0604020202020204" pitchFamily="34" charset="0"/>
-                  </a:rPr>
-                  <a:t> </a:t>
-                </a:r>
-                <a:r>
-                  <a:rPr lang="en-US" sz="1600" b="0" dirty="0">
-                    <a:latin typeface="Arial" panose="020B0604020202020204" pitchFamily="34" charset="0"/>
-                    <a:cs typeface="Arial" panose="020B0604020202020204" pitchFamily="34" charset="0"/>
-                  </a:rPr>
-                  <a:t>trees</a:t>
+                  <a:t>Points</a:t>
                 </a:r>
               </a:p>
             </c:rich>
@@ -1779,8 +1751,8 @@
             <c:manualLayout>
               <c:xMode val="edge"/>
               <c:yMode val="edge"/>
-              <c:x val="1.7187500000000001E-2"/>
-              <c:y val="0.33017972870449502"/>
+              <c:x val="9.3749999999999997E-3"/>
+              <c:y val="0.43564847221650638"/>
             </c:manualLayout>
           </c:layout>
           <c:overlay val="0"/>
@@ -1848,7 +1820,7 @@
         <c:crossAx val="816337520"/>
         <c:crosses val="autoZero"/>
         <c:crossBetween val="between"/>
-        <c:majorUnit val="1"/>
+        <c:majorUnit val="5"/>
       </c:valAx>
       <c:spPr>
         <a:pattFill prst="pct20">
@@ -2078,7 +2050,7 @@
         <c:axId val="510073344"/>
         <c:scaling>
           <c:orientation val="minMax"/>
-          <c:max val="6"/>
+          <c:max val="30"/>
           <c:min val="0"/>
         </c:scaling>
         <c:delete val="0"/>
@@ -2121,21 +2093,7 @@
                     <a:latin typeface="Arial" panose="020B0604020202020204" pitchFamily="34" charset="0"/>
                     <a:cs typeface="Arial" panose="020B0604020202020204" pitchFamily="34" charset="0"/>
                   </a:rPr>
-                  <a:t>Amount of planted</a:t>
-                </a:r>
-                <a:r>
-                  <a:rPr lang="en-US" sz="1600" b="0" baseline="0" dirty="0">
-                    <a:latin typeface="Arial" panose="020B0604020202020204" pitchFamily="34" charset="0"/>
-                    <a:cs typeface="Arial" panose="020B0604020202020204" pitchFamily="34" charset="0"/>
-                  </a:rPr>
-                  <a:t> </a:t>
-                </a:r>
-                <a:r>
-                  <a:rPr lang="en-US" sz="1600" b="0" dirty="0">
-                    <a:latin typeface="Arial" panose="020B0604020202020204" pitchFamily="34" charset="0"/>
-                    <a:cs typeface="Arial" panose="020B0604020202020204" pitchFamily="34" charset="0"/>
-                  </a:rPr>
-                  <a:t>trees</a:t>
+                  <a:t>Points</a:t>
                 </a:r>
               </a:p>
             </c:rich>
@@ -2144,8 +2102,8 @@
             <c:manualLayout>
               <c:xMode val="edge"/>
               <c:yMode val="edge"/>
-              <c:x val="1.7187500000000001E-2"/>
-              <c:y val="0.33017972870449502"/>
+              <c:x val="6.2500000000000003E-3"/>
+              <c:y val="0.41924222322574906"/>
             </c:manualLayout>
           </c:layout>
           <c:overlay val="0"/>
@@ -2213,7 +2171,7 @@
         <c:crossAx val="816337520"/>
         <c:crosses val="autoZero"/>
         <c:crossBetween val="between"/>
-        <c:majorUnit val="1"/>
+        <c:majorUnit val="5"/>
       </c:valAx>
       <c:spPr>
         <a:pattFill prst="pct20">
@@ -6325,11 +6283,11 @@
   <cdr:relSizeAnchor xmlns:cdr="http://schemas.openxmlformats.org/drawingml/2006/chartDrawing">
     <cdr:from>
       <cdr:x>0.48404</cdr:x>
-      <cdr:y>0.2</cdr:y>
+      <cdr:y>0.1951</cdr:y>
     </cdr:from>
     <cdr:to>
       <cdr:x>0.60514</cdr:x>
-      <cdr:y>0.48828</cdr:y>
+      <cdr:y>0.48895</cdr:y>
     </cdr:to>
     <cdr:sp macro="" textlink="">
       <cdr:nvSpPr>
@@ -6344,8 +6302,8 @@
       </cdr:nvSpPr>
       <cdr:spPr>
         <a:xfrm xmlns:a="http://schemas.openxmlformats.org/drawingml/2006/main">
-          <a:off x="3934285" y="1083734"/>
-          <a:ext cx="984301" cy="1562093"/>
+          <a:off x="3934285" y="1057188"/>
+          <a:ext cx="984301" cy="1592273"/>
         </a:xfrm>
         <a:prstGeom xmlns:a="http://schemas.openxmlformats.org/drawingml/2006/main" prst="rect">
           <a:avLst/>
@@ -6470,11 +6428,11 @@
   <cdr:relSizeAnchor xmlns:cdr="http://schemas.openxmlformats.org/drawingml/2006/chartDrawing">
     <cdr:from>
       <cdr:x>0.48404</cdr:x>
-      <cdr:y>0.34414</cdr:y>
+      <cdr:y>0.34203</cdr:y>
     </cdr:from>
     <cdr:to>
       <cdr:x>0.60514</cdr:x>
-      <cdr:y>0.34414</cdr:y>
+      <cdr:y>0.34203</cdr:y>
     </cdr:to>
     <cdr:cxnSp macro="">
       <cdr:nvCxnSpPr>
@@ -6492,7 +6450,7 @@
       </cdr:nvCxnSpPr>
       <cdr:spPr>
         <a:xfrm xmlns:a="http://schemas.openxmlformats.org/drawingml/2006/main">
-          <a:off x="3934285" y="1864781"/>
+          <a:off x="3934285" y="1853325"/>
           <a:ext cx="984301" cy="0"/>
         </a:xfrm>
         <a:prstGeom xmlns:a="http://schemas.openxmlformats.org/drawingml/2006/main" prst="line">
@@ -6923,11 +6881,11 @@
   </cdr:relSizeAnchor>
   <cdr:relSizeAnchor xmlns:cdr="http://schemas.openxmlformats.org/drawingml/2006/chartDrawing">
     <cdr:from>
-      <cdr:x>0.48404</cdr:x>
-      <cdr:y>0.48828</cdr:y>
+      <cdr:x>0.48437</cdr:x>
+      <cdr:y>0.48895</cdr:y>
     </cdr:from>
     <cdr:to>
-      <cdr:x>0.60514</cdr:x>
+      <cdr:x>0.60547</cdr:x>
       <cdr:y>0.78242</cdr:y>
     </cdr:to>
     <cdr:sp macro="" textlink="">
@@ -6943,8 +6901,8 @@
       </cdr:nvSpPr>
       <cdr:spPr>
         <a:xfrm xmlns:a="http://schemas.openxmlformats.org/drawingml/2006/main">
-          <a:off x="3934285" y="2645827"/>
-          <a:ext cx="984301" cy="1593855"/>
+          <a:off x="3936959" y="2649462"/>
+          <a:ext cx="984301" cy="1590212"/>
         </a:xfrm>
         <a:prstGeom xmlns:a="http://schemas.openxmlformats.org/drawingml/2006/main" prst="rect">
           <a:avLst/>
@@ -7068,12 +7026,12 @@
   </cdr:relSizeAnchor>
   <cdr:relSizeAnchor xmlns:cdr="http://schemas.openxmlformats.org/drawingml/2006/chartDrawing">
     <cdr:from>
-      <cdr:x>0.48404</cdr:x>
-      <cdr:y>0.63535</cdr:y>
+      <cdr:x>0.48437</cdr:x>
+      <cdr:y>0.63569</cdr:y>
     </cdr:from>
     <cdr:to>
-      <cdr:x>0.60514</cdr:x>
-      <cdr:y>0.63535</cdr:y>
+      <cdr:x>0.60547</cdr:x>
+      <cdr:y>0.63569</cdr:y>
     </cdr:to>
     <cdr:cxnSp macro="">
       <cdr:nvCxnSpPr>
@@ -7091,7 +7049,7 @@
       </cdr:nvCxnSpPr>
       <cdr:spPr>
         <a:xfrm xmlns:a="http://schemas.openxmlformats.org/drawingml/2006/main">
-          <a:off x="3934285" y="3442755"/>
+          <a:off x="3936959" y="3444568"/>
           <a:ext cx="984301" cy="0"/>
         </a:xfrm>
         <a:prstGeom xmlns:a="http://schemas.openxmlformats.org/drawingml/2006/main" prst="line">
@@ -8131,8 +8089,8 @@
       </cdr:nvSpPr>
       <cdr:spPr>
         <a:xfrm xmlns:a="http://schemas.openxmlformats.org/drawingml/2006/main">
-          <a:off x="3901765" y="1042691"/>
-          <a:ext cx="914400" cy="1596580"/>
+          <a:off x="3901765" y="1042715"/>
+          <a:ext cx="914400" cy="1596556"/>
         </a:xfrm>
         <a:prstGeom xmlns:a="http://schemas.openxmlformats.org/drawingml/2006/main" prst="rect">
           <a:avLst/>
@@ -8279,7 +8237,7 @@
       </cdr:nvCxnSpPr>
       <cdr:spPr>
         <a:xfrm xmlns:a="http://schemas.openxmlformats.org/drawingml/2006/main">
-          <a:off x="3901765" y="1840981"/>
+          <a:off x="3901765" y="1840993"/>
           <a:ext cx="914400" cy="0"/>
         </a:xfrm>
         <a:prstGeom xmlns:a="http://schemas.openxmlformats.org/drawingml/2006/main" prst="line">
@@ -8706,7 +8664,7 @@
     </cdr:from>
     <cdr:to>
       <cdr:x>0.59254</cdr:x>
-      <cdr:y>0.7836</cdr:y>
+      <cdr:y>0.78359</cdr:y>
     </cdr:to>
     <cdr:sp macro="" textlink="">
       <cdr:nvSpPr>
@@ -8721,8 +8679,8 @@
       </cdr:nvSpPr>
       <cdr:spPr>
         <a:xfrm xmlns:a="http://schemas.openxmlformats.org/drawingml/2006/main">
-          <a:off x="3901764" y="2649466"/>
-          <a:ext cx="914400" cy="1596580"/>
+          <a:off x="3901765" y="2649457"/>
+          <a:ext cx="914400" cy="1596556"/>
         </a:xfrm>
         <a:prstGeom xmlns:a="http://schemas.openxmlformats.org/drawingml/2006/main" prst="rect">
           <a:avLst/>
@@ -8869,7 +8827,7 @@
       </cdr:nvCxnSpPr>
       <cdr:spPr>
         <a:xfrm xmlns:a="http://schemas.openxmlformats.org/drawingml/2006/main">
-          <a:off x="3901764" y="3447756"/>
+          <a:off x="3901765" y="3447735"/>
           <a:ext cx="914400" cy="0"/>
         </a:xfrm>
         <a:prstGeom xmlns:a="http://schemas.openxmlformats.org/drawingml/2006/main" prst="line">
@@ -9239,7 +9197,7 @@
           <a:p>
             <a:fld id="{FACEE181-5E95-4012-89B5-E5CF011362D6}" type="datetimeFigureOut">
               <a:rPr lang="en-NL" smtClean="0"/>
-              <a:t>02/08/2021</a:t>
+              <a:t>08/09/2021</a:t>
             </a:fld>
             <a:endParaRPr lang="en-NL"/>
           </a:p>
@@ -9439,7 +9397,7 @@
           <a:p>
             <a:fld id="{FACEE181-5E95-4012-89B5-E5CF011362D6}" type="datetimeFigureOut">
               <a:rPr lang="en-NL" smtClean="0"/>
-              <a:t>02/08/2021</a:t>
+              <a:t>08/09/2021</a:t>
             </a:fld>
             <a:endParaRPr lang="en-NL"/>
           </a:p>
@@ -9649,7 +9607,7 @@
           <a:p>
             <a:fld id="{FACEE181-5E95-4012-89B5-E5CF011362D6}" type="datetimeFigureOut">
               <a:rPr lang="en-NL" smtClean="0"/>
-              <a:t>02/08/2021</a:t>
+              <a:t>08/09/2021</a:t>
             </a:fld>
             <a:endParaRPr lang="en-NL"/>
           </a:p>
@@ -9849,7 +9807,7 @@
           <a:p>
             <a:fld id="{FACEE181-5E95-4012-89B5-E5CF011362D6}" type="datetimeFigureOut">
               <a:rPr lang="en-NL" smtClean="0"/>
-              <a:t>02/08/2021</a:t>
+              <a:t>08/09/2021</a:t>
             </a:fld>
             <a:endParaRPr lang="en-NL"/>
           </a:p>
@@ -10125,7 +10083,7 @@
           <a:p>
             <a:fld id="{FACEE181-5E95-4012-89B5-E5CF011362D6}" type="datetimeFigureOut">
               <a:rPr lang="en-NL" smtClean="0"/>
-              <a:t>02/08/2021</a:t>
+              <a:t>08/09/2021</a:t>
             </a:fld>
             <a:endParaRPr lang="en-NL"/>
           </a:p>
@@ -10393,7 +10351,7 @@
           <a:p>
             <a:fld id="{FACEE181-5E95-4012-89B5-E5CF011362D6}" type="datetimeFigureOut">
               <a:rPr lang="en-NL" smtClean="0"/>
-              <a:t>02/08/2021</a:t>
+              <a:t>08/09/2021</a:t>
             </a:fld>
             <a:endParaRPr lang="en-NL"/>
           </a:p>
@@ -10808,7 +10766,7 @@
           <a:p>
             <a:fld id="{FACEE181-5E95-4012-89B5-E5CF011362D6}" type="datetimeFigureOut">
               <a:rPr lang="en-NL" smtClean="0"/>
-              <a:t>02/08/2021</a:t>
+              <a:t>08/09/2021</a:t>
             </a:fld>
             <a:endParaRPr lang="en-NL"/>
           </a:p>
@@ -10950,7 +10908,7 @@
           <a:p>
             <a:fld id="{FACEE181-5E95-4012-89B5-E5CF011362D6}" type="datetimeFigureOut">
               <a:rPr lang="en-NL" smtClean="0"/>
-              <a:t>02/08/2021</a:t>
+              <a:t>08/09/2021</a:t>
             </a:fld>
             <a:endParaRPr lang="en-NL"/>
           </a:p>
@@ -11063,7 +11021,7 @@
           <a:p>
             <a:fld id="{FACEE181-5E95-4012-89B5-E5CF011362D6}" type="datetimeFigureOut">
               <a:rPr lang="en-NL" smtClean="0"/>
-              <a:t>02/08/2021</a:t>
+              <a:t>08/09/2021</a:t>
             </a:fld>
             <a:endParaRPr lang="en-NL"/>
           </a:p>
@@ -11376,7 +11334,7 @@
           <a:p>
             <a:fld id="{FACEE181-5E95-4012-89B5-E5CF011362D6}" type="datetimeFigureOut">
               <a:rPr lang="en-NL" smtClean="0"/>
-              <a:t>02/08/2021</a:t>
+              <a:t>08/09/2021</a:t>
             </a:fld>
             <a:endParaRPr lang="en-NL"/>
           </a:p>
@@ -11665,7 +11623,7 @@
           <a:p>
             <a:fld id="{FACEE181-5E95-4012-89B5-E5CF011362D6}" type="datetimeFigureOut">
               <a:rPr lang="en-NL" smtClean="0"/>
-              <a:t>02/08/2021</a:t>
+              <a:t>08/09/2021</a:t>
             </a:fld>
             <a:endParaRPr lang="en-NL"/>
           </a:p>
@@ -11908,7 +11866,7 @@
           <a:p>
             <a:fld id="{FACEE181-5E95-4012-89B5-E5CF011362D6}" type="datetimeFigureOut">
               <a:rPr lang="en-NL" smtClean="0"/>
-              <a:t>02/08/2021</a:t>
+              <a:t>08/09/2021</a:t>
             </a:fld>
             <a:endParaRPr lang="en-NL"/>
           </a:p>
@@ -12338,7 +12296,7 @@
           <p:nvPr>
             <p:extLst>
               <p:ext uri="{D42A27DB-BD31-4B8C-83A1-F6EECF244321}">
-                <p14:modId xmlns:p14="http://schemas.microsoft.com/office/powerpoint/2010/main" val="3640488446"/>
+                <p14:modId xmlns:p14="http://schemas.microsoft.com/office/powerpoint/2010/main" val="3499112787"/>
               </p:ext>
             </p:extLst>
           </p:nvPr>
@@ -12504,7 +12462,7 @@
           <p:nvPr>
             <p:extLst>
               <p:ext uri="{D42A27DB-BD31-4B8C-83A1-F6EECF244321}">
-                <p14:modId xmlns:p14="http://schemas.microsoft.com/office/powerpoint/2010/main" val="4174973422"/>
+                <p14:modId xmlns:p14="http://schemas.microsoft.com/office/powerpoint/2010/main" val="3140217135"/>
               </p:ext>
             </p:extLst>
           </p:nvPr>
@@ -12630,7 +12588,7 @@
     </p:spTree>
     <p:extLst>
       <p:ext uri="{BB962C8B-B14F-4D97-AF65-F5344CB8AC3E}">
-        <p14:creationId xmlns:p14="http://schemas.microsoft.com/office/powerpoint/2010/main" val="1751361399"/>
+        <p14:creationId xmlns:p14="http://schemas.microsoft.com/office/powerpoint/2010/main" val="1626528851"/>
       </p:ext>
     </p:extLst>
   </p:cSld>
@@ -12670,7 +12628,7 @@
           <p:nvPr>
             <p:extLst>
               <p:ext uri="{D42A27DB-BD31-4B8C-83A1-F6EECF244321}">
-                <p14:modId xmlns:p14="http://schemas.microsoft.com/office/powerpoint/2010/main" val="1527929376"/>
+                <p14:modId xmlns:p14="http://schemas.microsoft.com/office/powerpoint/2010/main" val="1158988819"/>
               </p:ext>
             </p:extLst>
           </p:nvPr>
@@ -12796,7 +12754,7 @@
     </p:spTree>
     <p:extLst>
       <p:ext uri="{BB962C8B-B14F-4D97-AF65-F5344CB8AC3E}">
-        <p14:creationId xmlns:p14="http://schemas.microsoft.com/office/powerpoint/2010/main" val="389518916"/>
+        <p14:creationId xmlns:p14="http://schemas.microsoft.com/office/powerpoint/2010/main" val="37592818"/>
       </p:ext>
     </p:extLst>
   </p:cSld>
@@ -12836,7 +12794,7 @@
           <p:nvPr>
             <p:extLst>
               <p:ext uri="{D42A27DB-BD31-4B8C-83A1-F6EECF244321}">
-                <p14:modId xmlns:p14="http://schemas.microsoft.com/office/powerpoint/2010/main" val="1820720623"/>
+                <p14:modId xmlns:p14="http://schemas.microsoft.com/office/powerpoint/2010/main" val="942760570"/>
               </p:ext>
             </p:extLst>
           </p:nvPr>
@@ -13006,7 +12964,7 @@
           <p:nvPr>
             <p:extLst>
               <p:ext uri="{D42A27DB-BD31-4B8C-83A1-F6EECF244321}">
-                <p14:modId xmlns:p14="http://schemas.microsoft.com/office/powerpoint/2010/main" val="3237414396"/>
+                <p14:modId xmlns:p14="http://schemas.microsoft.com/office/powerpoint/2010/main" val="339498318"/>
               </p:ext>
             </p:extLst>
           </p:nvPr>
@@ -13136,7 +13094,7 @@
     </p:spTree>
     <p:extLst>
       <p:ext uri="{BB962C8B-B14F-4D97-AF65-F5344CB8AC3E}">
-        <p14:creationId xmlns:p14="http://schemas.microsoft.com/office/powerpoint/2010/main" val="3381524888"/>
+        <p14:creationId xmlns:p14="http://schemas.microsoft.com/office/powerpoint/2010/main" val="2850507349"/>
       </p:ext>
     </p:extLst>
   </p:cSld>
@@ -13176,7 +13134,7 @@
           <p:nvPr>
             <p:extLst>
               <p:ext uri="{D42A27DB-BD31-4B8C-83A1-F6EECF244321}">
-                <p14:modId xmlns:p14="http://schemas.microsoft.com/office/powerpoint/2010/main" val="2926521153"/>
+                <p14:modId xmlns:p14="http://schemas.microsoft.com/office/powerpoint/2010/main" val="722373381"/>
               </p:ext>
             </p:extLst>
           </p:nvPr>
@@ -13306,7 +13264,7 @@
     </p:spTree>
     <p:extLst>
       <p:ext uri="{BB962C8B-B14F-4D97-AF65-F5344CB8AC3E}">
-        <p14:creationId xmlns:p14="http://schemas.microsoft.com/office/powerpoint/2010/main" val="2357798601"/>
+        <p14:creationId xmlns:p14="http://schemas.microsoft.com/office/powerpoint/2010/main" val="713398853"/>
       </p:ext>
     </p:extLst>
   </p:cSld>

</xml_diff>